<commit_message>
<have uploaded all the previous files>
</commit_message>
<xml_diff>
--- a/JavaBasis/Chapter12_FileAndIO/src/IO流.pptx
+++ b/JavaBasis/Chapter12_FileAndIO/src/IO流.pptx
@@ -210,7 +210,7 @@
           <a:p>
             <a:fld id="{7F25A8C7-CC1A-4A08-9B4B-31F43B054C7F}" type="datetimeFigureOut">
               <a:rPr lang="zh-CN" altLang="en-US" smtClean="0"/>
-              <a:t>2022/12/10</a:t>
+              <a:t>2023/10/7</a:t>
             </a:fld>
             <a:endParaRPr lang="zh-CN" altLang="en-US"/>
           </a:p>
@@ -739,7 +739,7 @@
           <a:p>
             <a:fld id="{D997B5FA-0921-464F-AAE1-844C04324D75}" type="datetimeFigureOut">
               <a:rPr lang="zh-CN" altLang="en-US" smtClean="0"/>
-              <a:t>2022/12/10</a:t>
+              <a:t>2023/10/7</a:t>
             </a:fld>
             <a:endParaRPr lang="zh-CN" altLang="en-US" dirty="0"/>
           </a:p>
@@ -844,7 +844,7 @@
           <a:p>
             <a:fld id="{760FBDFE-C587-4B4C-A407-44438C67B59E}" type="datetimeFigureOut">
               <a:rPr lang="zh-CN" altLang="en-US" smtClean="0"/>
-              <a:t>2022/12/10</a:t>
+              <a:t>2023/10/7</a:t>
             </a:fld>
             <a:endParaRPr lang="zh-CN" altLang="en-US"/>
           </a:p>
@@ -1104,7 +1104,7 @@
           <a:p>
             <a:fld id="{760FBDFE-C587-4B4C-A407-44438C67B59E}" type="datetimeFigureOut">
               <a:rPr lang="zh-CN" altLang="en-US" smtClean="0"/>
-              <a:t>2022/12/10</a:t>
+              <a:t>2023/10/7</a:t>
             </a:fld>
             <a:endParaRPr lang="zh-CN" altLang="en-US" dirty="0"/>
           </a:p>
@@ -1209,7 +1209,7 @@
           <a:p>
             <a:fld id="{20DD7636-5BE1-44BC-BB5F-15739D9E18E1}" type="datetimeFigureOut">
               <a:rPr lang="zh-CN" altLang="en-US" smtClean="0"/>
-              <a:t>2022/12/10</a:t>
+              <a:t>2023/10/7</a:t>
             </a:fld>
             <a:endParaRPr lang="zh-CN" altLang="en-US"/>
           </a:p>
@@ -1486,7 +1486,7 @@
           <a:p>
             <a:fld id="{760FBDFE-C587-4B4C-A407-44438C67B59E}" type="datetimeFigureOut">
               <a:rPr lang="zh-CN" altLang="en-US" smtClean="0"/>
-              <a:t>2022/12/10</a:t>
+              <a:t>2023/10/7</a:t>
             </a:fld>
             <a:endParaRPr lang="zh-CN" altLang="en-US"/>
           </a:p>
@@ -1860,7 +1860,7 @@
           <a:p>
             <a:fld id="{760FBDFE-C587-4B4C-A407-44438C67B59E}" type="datetimeFigureOut">
               <a:rPr lang="zh-CN" altLang="en-US" smtClean="0"/>
-              <a:t>2022/12/10</a:t>
+              <a:t>2023/10/7</a:t>
             </a:fld>
             <a:endParaRPr lang="zh-CN" altLang="en-US"/>
           </a:p>
@@ -2002,7 +2002,7 @@
           <a:p>
             <a:fld id="{20DD7636-5BE1-44BC-BB5F-15739D9E18E1}" type="datetimeFigureOut">
               <a:rPr lang="zh-CN" altLang="en-US" smtClean="0"/>
-              <a:t>2022/12/10</a:t>
+              <a:t>2023/10/7</a:t>
             </a:fld>
             <a:endParaRPr lang="zh-CN" altLang="en-US"/>
           </a:p>
@@ -2146,7 +2146,7 @@
           <a:p>
             <a:fld id="{760FBDFE-C587-4B4C-A407-44438C67B59E}" type="datetimeFigureOut">
               <a:rPr lang="zh-CN" altLang="en-US" smtClean="0"/>
-              <a:t>2022/12/10</a:t>
+              <a:t>2023/10/7</a:t>
             </a:fld>
             <a:endParaRPr lang="zh-CN" altLang="en-US"/>
           </a:p>
@@ -2412,7 +2412,7 @@
           <a:p>
             <a:fld id="{9EFD9D74-47D9-4702-A33C-335B63B48DBF}" type="datetimeFigureOut">
               <a:rPr lang="zh-CN" altLang="en-US" smtClean="0"/>
-              <a:t>2022/12/10</a:t>
+              <a:t>2023/10/7</a:t>
             </a:fld>
             <a:endParaRPr lang="zh-CN" altLang="en-US" dirty="0"/>
           </a:p>
@@ -2606,7 +2606,7 @@
           <a:p>
             <a:fld id="{760FBDFE-C587-4B4C-A407-44438C67B59E}" type="datetimeFigureOut">
               <a:rPr lang="zh-CN" altLang="en-US" smtClean="0"/>
-              <a:t>2022/12/10</a:t>
+              <a:t>2023/10/7</a:t>
             </a:fld>
             <a:endParaRPr lang="zh-CN" altLang="en-US"/>
           </a:p>
@@ -3584,48 +3584,6 @@
           </a:p>
         </p:txBody>
       </p:sp>
-      <p:cxnSp>
-        <p:nvCxnSpPr>
-          <p:cNvPr id="13" name="直接箭头连接符 12">
-            <a:extLst>
-              <a:ext uri="{FF2B5EF4-FFF2-40B4-BE49-F238E27FC236}">
-                <a16:creationId xmlns:a16="http://schemas.microsoft.com/office/drawing/2014/main" id="{DB55C842-B796-6016-8832-134E5FD5441C}"/>
-              </a:ext>
-            </a:extLst>
-          </p:cNvPr>
-          <p:cNvCxnSpPr/>
-          <p:nvPr/>
-        </p:nvCxnSpPr>
-        <p:spPr>
-          <a:xfrm flipH="1">
-            <a:off x="5964382" y="1101436"/>
-            <a:ext cx="862445" cy="1731384"/>
-          </a:xfrm>
-          <a:prstGeom prst="straightConnector1">
-            <a:avLst/>
-          </a:prstGeom>
-          <a:ln w="22225">
-            <a:solidFill>
-              <a:srgbClr val="FF0000"/>
-            </a:solidFill>
-            <a:tailEnd type="triangle"/>
-          </a:ln>
-        </p:spPr>
-        <p:style>
-          <a:lnRef idx="1">
-            <a:schemeClr val="accent1"/>
-          </a:lnRef>
-          <a:fillRef idx="0">
-            <a:schemeClr val="accent1"/>
-          </a:fillRef>
-          <a:effectRef idx="0">
-            <a:schemeClr val="accent1"/>
-          </a:effectRef>
-          <a:fontRef idx="minor">
-            <a:schemeClr val="tx1"/>
-          </a:fontRef>
-        </p:style>
-      </p:cxnSp>
       <p:sp>
         <p:nvSpPr>
           <p:cNvPr id="14" name="文本框 13">
@@ -3999,6 +3957,48 @@
           </a:p>
         </p:txBody>
       </p:sp>
+      <p:cxnSp>
+        <p:nvCxnSpPr>
+          <p:cNvPr id="13" name="直接箭头连接符 12">
+            <a:extLst>
+              <a:ext uri="{FF2B5EF4-FFF2-40B4-BE49-F238E27FC236}">
+                <a16:creationId xmlns:a16="http://schemas.microsoft.com/office/drawing/2014/main" id="{DB55C842-B796-6016-8832-134E5FD5441C}"/>
+              </a:ext>
+            </a:extLst>
+          </p:cNvPr>
+          <p:cNvCxnSpPr/>
+          <p:nvPr/>
+        </p:nvCxnSpPr>
+        <p:spPr>
+          <a:xfrm flipH="1">
+            <a:off x="5964382" y="1101436"/>
+            <a:ext cx="862445" cy="1731384"/>
+          </a:xfrm>
+          <a:prstGeom prst="straightConnector1">
+            <a:avLst/>
+          </a:prstGeom>
+          <a:ln w="22225">
+            <a:solidFill>
+              <a:srgbClr val="FF0000"/>
+            </a:solidFill>
+            <a:tailEnd type="triangle"/>
+          </a:ln>
+        </p:spPr>
+        <p:style>
+          <a:lnRef idx="1">
+            <a:schemeClr val="accent1"/>
+          </a:lnRef>
+          <a:fillRef idx="0">
+            <a:schemeClr val="accent1"/>
+          </a:fillRef>
+          <a:effectRef idx="0">
+            <a:schemeClr val="accent1"/>
+          </a:effectRef>
+          <a:fontRef idx="minor">
+            <a:schemeClr val="tx1"/>
+          </a:fontRef>
+        </p:style>
+      </p:cxnSp>
     </p:spTree>
     <p:extLst>
       <p:ext uri="{BB962C8B-B14F-4D97-AF65-F5344CB8AC3E}">

</xml_diff>